<commit_message>
rerun well max perc
</commit_message>
<xml_diff>
--- a/results/add 8ori_2isi_multisess, and apply vis strict filter/compare.pptx
+++ b/results/add 8ori_2isi_multisess, and apply vis strict filter/compare.pptx
@@ -5,10 +5,13 @@
     <p:sldMasterId id="2147483648" r:id="rId1"/>
   </p:sldMasterIdLst>
   <p:sldIdLst>
-    <p:sldId id="256" r:id="rId2"/>
-    <p:sldId id="257" r:id="rId3"/>
-    <p:sldId id="258" r:id="rId4"/>
-    <p:sldId id="259" r:id="rId5"/>
+    <p:sldId id="257" r:id="rId2"/>
+    <p:sldId id="258" r:id="rId3"/>
+    <p:sldId id="259" r:id="rId4"/>
+    <p:sldId id="260" r:id="rId5"/>
+    <p:sldId id="261" r:id="rId6"/>
+    <p:sldId id="262" r:id="rId7"/>
+    <p:sldId id="263" r:id="rId8"/>
   </p:sldIdLst>
   <p:sldSz cx="12192000" cy="6858000"/>
   <p:notesSz cx="6858000" cy="9144000"/>
@@ -3331,10 +3334,10 @@
       </p:grpSpPr>
       <p:pic>
         <p:nvPicPr>
-          <p:cNvPr id="4" name="Picture 3">
-            <a:extLst>
-              <a:ext uri="{FF2B5EF4-FFF2-40B4-BE49-F238E27FC236}">
-                <a16:creationId xmlns:a16="http://schemas.microsoft.com/office/drawing/2014/main" id="{4A309500-9EDE-4E33-A7D0-FAFA4B3BBB22}"/>
+          <p:cNvPr id="2" name="Picture 1">
+            <a:extLst>
+              <a:ext uri="{FF2B5EF4-FFF2-40B4-BE49-F238E27FC236}">
+                <a16:creationId xmlns:a16="http://schemas.microsoft.com/office/drawing/2014/main" id="{06AD52DE-C03A-48FE-8EF1-B42942C748EB}"/>
               </a:ext>
             </a:extLst>
           </p:cNvPr>
@@ -3351,20 +3354,72 @@
         </p:blipFill>
         <p:spPr>
           <a:xfrm>
-            <a:off x="704739" y="2616377"/>
-            <a:ext cx="2552921" cy="1905165"/>
+            <a:off x="544382" y="2224087"/>
+            <a:ext cx="3190875" cy="2409825"/>
           </a:xfrm>
           <a:prstGeom prst="rect">
             <a:avLst/>
           </a:prstGeom>
         </p:spPr>
       </p:pic>
+      <p:sp>
+        <p:nvSpPr>
+          <p:cNvPr id="3" name="TextBox 2">
+            <a:extLst>
+              <a:ext uri="{FF2B5EF4-FFF2-40B4-BE49-F238E27FC236}">
+                <a16:creationId xmlns:a16="http://schemas.microsoft.com/office/drawing/2014/main" id="{66CC091C-4EA7-4035-AD2A-02B30A26E44F}"/>
+              </a:ext>
+            </a:extLst>
+          </p:cNvPr>
+          <p:cNvSpPr txBox="1"/>
+          <p:nvPr/>
+        </p:nvSpPr>
+        <p:spPr>
+          <a:xfrm>
+            <a:off x="1772816" y="1270093"/>
+            <a:ext cx="9974424" cy="369332"/>
+          </a:xfrm>
+          <a:prstGeom prst="rect">
+            <a:avLst/>
+          </a:prstGeom>
+          <a:noFill/>
+        </p:spPr>
+        <p:txBody>
+          <a:bodyPr wrap="square" rtlCol="0">
+            <a:spAutoFit/>
+          </a:bodyPr>
+          <a:lstStyle/>
+          <a:p>
+            <a:pPr algn="ctr"/>
+            <a:r>
+              <a:rPr lang="en-US"/>
+              <a:t>Original                               -&gt; add multisess date -&gt;                        apply vis strict filter (using </a:t>
+            </a:r>
+            <a:r>
+              <a:rPr lang="en-US" err="1"/>
+              <a:t>pval</a:t>
+            </a:r>
+            <a:r>
+              <a:rPr lang="en-US"/>
+              <a:t> &lt; </a:t>
+            </a:r>
+            <a:r>
+              <a:rPr lang="en-US" err="1"/>
+              <a:t>p_bonf</a:t>
+            </a:r>
+            <a:r>
+              <a:rPr lang="en-US"/>
+              <a:t>)</a:t>
+            </a:r>
+          </a:p>
+        </p:txBody>
+      </p:sp>
       <p:pic>
         <p:nvPicPr>
-          <p:cNvPr id="5" name="Picture 4">
-            <a:extLst>
-              <a:ext uri="{FF2B5EF4-FFF2-40B4-BE49-F238E27FC236}">
-                <a16:creationId xmlns:a16="http://schemas.microsoft.com/office/drawing/2014/main" id="{9EF90161-F0F9-4FC0-9A80-75743CD8561F}"/>
+          <p:cNvPr id="4" name="Picture 3">
+            <a:extLst>
+              <a:ext uri="{FF2B5EF4-FFF2-40B4-BE49-F238E27FC236}">
+                <a16:creationId xmlns:a16="http://schemas.microsoft.com/office/drawing/2014/main" id="{375737BA-D70A-4821-ADFD-0EBF9652B2C0}"/>
               </a:ext>
             </a:extLst>
           </p:cNvPr>
@@ -3381,8 +3436,8 @@
         </p:blipFill>
         <p:spPr>
           <a:xfrm>
-            <a:off x="4056138" y="2630373"/>
-            <a:ext cx="2568163" cy="1912786"/>
+            <a:off x="4054248" y="2290761"/>
+            <a:ext cx="3038475" cy="2276475"/>
           </a:xfrm>
           <a:prstGeom prst="rect">
             <a:avLst/>
@@ -3391,10 +3446,10 @@
       </p:pic>
       <p:pic>
         <p:nvPicPr>
-          <p:cNvPr id="6" name="Picture 5">
-            <a:extLst>
-              <a:ext uri="{FF2B5EF4-FFF2-40B4-BE49-F238E27FC236}">
-                <a16:creationId xmlns:a16="http://schemas.microsoft.com/office/drawing/2014/main" id="{E0C7C7A7-4C9E-4879-A3E7-04A9996D0E81}"/>
+          <p:cNvPr id="5" name="Picture 4">
+            <a:extLst>
+              <a:ext uri="{FF2B5EF4-FFF2-40B4-BE49-F238E27FC236}">
+                <a16:creationId xmlns:a16="http://schemas.microsoft.com/office/drawing/2014/main" id="{DCEADB08-D1F0-453E-9BCB-CDD0EE8A5EE5}"/>
               </a:ext>
             </a:extLst>
           </p:cNvPr>
@@ -3411,70 +3466,18 @@
         </p:blipFill>
         <p:spPr>
           <a:xfrm>
-            <a:off x="7596103" y="2616377"/>
-            <a:ext cx="2392887" cy="1844200"/>
+            <a:off x="8364990" y="2205036"/>
+            <a:ext cx="3038475" cy="2362200"/>
           </a:xfrm>
           <a:prstGeom prst="rect">
             <a:avLst/>
           </a:prstGeom>
         </p:spPr>
       </p:pic>
-      <p:sp>
-        <p:nvSpPr>
-          <p:cNvPr id="7" name="TextBox 6">
-            <a:extLst>
-              <a:ext uri="{FF2B5EF4-FFF2-40B4-BE49-F238E27FC236}">
-                <a16:creationId xmlns:a16="http://schemas.microsoft.com/office/drawing/2014/main" id="{952631A4-A836-4175-A0B4-8E0E9BFF5336}"/>
-              </a:ext>
-            </a:extLst>
-          </p:cNvPr>
-          <p:cNvSpPr txBox="1"/>
-          <p:nvPr/>
-        </p:nvSpPr>
-        <p:spPr>
-          <a:xfrm>
-            <a:off x="1772816" y="1270093"/>
-            <a:ext cx="9974424" cy="369332"/>
-          </a:xfrm>
-          <a:prstGeom prst="rect">
-            <a:avLst/>
-          </a:prstGeom>
-          <a:noFill/>
-        </p:spPr>
-        <p:txBody>
-          <a:bodyPr wrap="square" rtlCol="0">
-            <a:spAutoFit/>
-          </a:bodyPr>
-          <a:lstStyle/>
-          <a:p>
-            <a:pPr algn="ctr"/>
-            <a:r>
-              <a:rPr lang="en-US"/>
-              <a:t>Original                               -&gt; add multisess date -&gt;                        apply vis strict filter (using </a:t>
-            </a:r>
-            <a:r>
-              <a:rPr lang="en-US" err="1"/>
-              <a:t>pval</a:t>
-            </a:r>
-            <a:r>
-              <a:rPr lang="en-US"/>
-              <a:t> &lt; </a:t>
-            </a:r>
-            <a:r>
-              <a:rPr lang="en-US" err="1"/>
-              <a:t>p_bonf</a:t>
-            </a:r>
-            <a:r>
-              <a:rPr lang="en-US"/>
-              <a:t>)</a:t>
-            </a:r>
-          </a:p>
-        </p:txBody>
-      </p:sp>
     </p:spTree>
     <p:extLst>
       <p:ext uri="{BB962C8B-B14F-4D97-AF65-F5344CB8AC3E}">
-        <p14:creationId xmlns:p14="http://schemas.microsoft.com/office/powerpoint/2010/main" val="2183857925"/>
+        <p14:creationId xmlns:p14="http://schemas.microsoft.com/office/powerpoint/2010/main" val="3797066541"/>
       </p:ext>
     </p:extLst>
   </p:cSld>
@@ -3501,12 +3504,64 @@
           <a:chExt cx="0" cy="0"/>
         </a:xfrm>
       </p:grpSpPr>
+      <p:sp>
+        <p:nvSpPr>
+          <p:cNvPr id="2" name="TextBox 1">
+            <a:extLst>
+              <a:ext uri="{FF2B5EF4-FFF2-40B4-BE49-F238E27FC236}">
+                <a16:creationId xmlns:a16="http://schemas.microsoft.com/office/drawing/2014/main" id="{B44701F2-92D0-490C-B4DF-7C661145E4AA}"/>
+              </a:ext>
+            </a:extLst>
+          </p:cNvPr>
+          <p:cNvSpPr txBox="1"/>
+          <p:nvPr/>
+        </p:nvSpPr>
+        <p:spPr>
+          <a:xfrm>
+            <a:off x="1772816" y="1270093"/>
+            <a:ext cx="9974424" cy="369332"/>
+          </a:xfrm>
+          <a:prstGeom prst="rect">
+            <a:avLst/>
+          </a:prstGeom>
+          <a:noFill/>
+        </p:spPr>
+        <p:txBody>
+          <a:bodyPr wrap="square" rtlCol="0">
+            <a:spAutoFit/>
+          </a:bodyPr>
+          <a:lstStyle/>
+          <a:p>
+            <a:pPr algn="ctr"/>
+            <a:r>
+              <a:rPr lang="en-US"/>
+              <a:t>Original                               -&gt; add multisess date -&gt;                        apply vis strict filter (using </a:t>
+            </a:r>
+            <a:r>
+              <a:rPr lang="en-US" err="1"/>
+              <a:t>pval</a:t>
+            </a:r>
+            <a:r>
+              <a:rPr lang="en-US"/>
+              <a:t> &lt; </a:t>
+            </a:r>
+            <a:r>
+              <a:rPr lang="en-US" err="1"/>
+              <a:t>p_bonf</a:t>
+            </a:r>
+            <a:r>
+              <a:rPr lang="en-US"/>
+              <a:t>)</a:t>
+            </a:r>
+          </a:p>
+        </p:txBody>
+      </p:sp>
       <p:pic>
         <p:nvPicPr>
-          <p:cNvPr id="2" name="Picture 1">
-            <a:extLst>
-              <a:ext uri="{FF2B5EF4-FFF2-40B4-BE49-F238E27FC236}">
-                <a16:creationId xmlns:a16="http://schemas.microsoft.com/office/drawing/2014/main" id="{06AD52DE-C03A-48FE-8EF1-B42942C748EB}"/>
+          <p:cNvPr id="3" name="Picture 2">
+            <a:extLst>
+              <a:ext uri="{FF2B5EF4-FFF2-40B4-BE49-F238E27FC236}">
+                <a16:creationId xmlns:a16="http://schemas.microsoft.com/office/drawing/2014/main" id="{4B2BE6C7-8449-4135-A4BE-083ED801AD30}"/>
               </a:ext>
             </a:extLst>
           </p:cNvPr>
@@ -3523,72 +3578,20 @@
         </p:blipFill>
         <p:spPr>
           <a:xfrm>
-            <a:off x="544382" y="2224087"/>
-            <a:ext cx="3190875" cy="2409825"/>
+            <a:off x="3904958" y="2687605"/>
+            <a:ext cx="3038475" cy="2247900"/>
           </a:xfrm>
           <a:prstGeom prst="rect">
             <a:avLst/>
           </a:prstGeom>
         </p:spPr>
       </p:pic>
-      <p:sp>
-        <p:nvSpPr>
-          <p:cNvPr id="3" name="TextBox 2">
-            <a:extLst>
-              <a:ext uri="{FF2B5EF4-FFF2-40B4-BE49-F238E27FC236}">
-                <a16:creationId xmlns:a16="http://schemas.microsoft.com/office/drawing/2014/main" id="{66CC091C-4EA7-4035-AD2A-02B30A26E44F}"/>
-              </a:ext>
-            </a:extLst>
-          </p:cNvPr>
-          <p:cNvSpPr txBox="1"/>
-          <p:nvPr/>
-        </p:nvSpPr>
-        <p:spPr>
-          <a:xfrm>
-            <a:off x="1772816" y="1270093"/>
-            <a:ext cx="9974424" cy="369332"/>
-          </a:xfrm>
-          <a:prstGeom prst="rect">
-            <a:avLst/>
-          </a:prstGeom>
-          <a:noFill/>
-        </p:spPr>
-        <p:txBody>
-          <a:bodyPr wrap="square" rtlCol="0">
-            <a:spAutoFit/>
-          </a:bodyPr>
-          <a:lstStyle/>
-          <a:p>
-            <a:pPr algn="ctr"/>
-            <a:r>
-              <a:rPr lang="en-US"/>
-              <a:t>Original                               -&gt; add multisess date -&gt;                        apply vis strict filter (using </a:t>
-            </a:r>
-            <a:r>
-              <a:rPr lang="en-US" err="1"/>
-              <a:t>pval</a:t>
-            </a:r>
-            <a:r>
-              <a:rPr lang="en-US"/>
-              <a:t> &lt; </a:t>
-            </a:r>
-            <a:r>
-              <a:rPr lang="en-US" err="1"/>
-              <a:t>p_bonf</a:t>
-            </a:r>
-            <a:r>
-              <a:rPr lang="en-US"/>
-              <a:t>)</a:t>
-            </a:r>
-          </a:p>
-        </p:txBody>
-      </p:sp>
       <p:pic>
         <p:nvPicPr>
           <p:cNvPr id="4" name="Picture 3">
             <a:extLst>
               <a:ext uri="{FF2B5EF4-FFF2-40B4-BE49-F238E27FC236}">
-                <a16:creationId xmlns:a16="http://schemas.microsoft.com/office/drawing/2014/main" id="{375737BA-D70A-4821-ADFD-0EBF9652B2C0}"/>
+                <a16:creationId xmlns:a16="http://schemas.microsoft.com/office/drawing/2014/main" id="{301754D8-8DD9-4284-A082-55630AC9F625}"/>
               </a:ext>
             </a:extLst>
           </p:cNvPr>
@@ -3605,8 +3608,8 @@
         </p:blipFill>
         <p:spPr>
           <a:xfrm>
-            <a:off x="4054248" y="2290761"/>
-            <a:ext cx="3038475" cy="2276475"/>
+            <a:off x="756946" y="2687605"/>
+            <a:ext cx="2933700" cy="2247900"/>
           </a:xfrm>
           <a:prstGeom prst="rect">
             <a:avLst/>
@@ -3618,7 +3621,7 @@
           <p:cNvPr id="5" name="Picture 4">
             <a:extLst>
               <a:ext uri="{FF2B5EF4-FFF2-40B4-BE49-F238E27FC236}">
-                <a16:creationId xmlns:a16="http://schemas.microsoft.com/office/drawing/2014/main" id="{DCEADB08-D1F0-453E-9BCB-CDD0EE8A5EE5}"/>
+                <a16:creationId xmlns:a16="http://schemas.microsoft.com/office/drawing/2014/main" id="{4250141F-D502-4353-8DE1-30267ECBA760}"/>
               </a:ext>
             </a:extLst>
           </p:cNvPr>
@@ -3635,8 +3638,8 @@
         </p:blipFill>
         <p:spPr>
           <a:xfrm>
-            <a:off x="8364990" y="2205036"/>
-            <a:ext cx="3038475" cy="2362200"/>
+            <a:off x="8224643" y="2630455"/>
+            <a:ext cx="3076575" cy="2362200"/>
           </a:xfrm>
           <a:prstGeom prst="rect">
             <a:avLst/>
@@ -3646,7 +3649,7 @@
     </p:spTree>
     <p:extLst>
       <p:ext uri="{BB962C8B-B14F-4D97-AF65-F5344CB8AC3E}">
-        <p14:creationId xmlns:p14="http://schemas.microsoft.com/office/powerpoint/2010/main" val="3797066541"/>
+        <p14:creationId xmlns:p14="http://schemas.microsoft.com/office/powerpoint/2010/main" val="1213322900"/>
       </p:ext>
     </p:extLst>
   </p:cSld>
@@ -3673,64 +3676,12 @@
           <a:chExt cx="0" cy="0"/>
         </a:xfrm>
       </p:grpSpPr>
-      <p:sp>
-        <p:nvSpPr>
-          <p:cNvPr id="2" name="TextBox 1">
-            <a:extLst>
-              <a:ext uri="{FF2B5EF4-FFF2-40B4-BE49-F238E27FC236}">
-                <a16:creationId xmlns:a16="http://schemas.microsoft.com/office/drawing/2014/main" id="{B44701F2-92D0-490C-B4DF-7C661145E4AA}"/>
-              </a:ext>
-            </a:extLst>
-          </p:cNvPr>
-          <p:cNvSpPr txBox="1"/>
-          <p:nvPr/>
-        </p:nvSpPr>
-        <p:spPr>
-          <a:xfrm>
-            <a:off x="1772816" y="1270093"/>
-            <a:ext cx="9974424" cy="369332"/>
-          </a:xfrm>
-          <a:prstGeom prst="rect">
-            <a:avLst/>
-          </a:prstGeom>
-          <a:noFill/>
-        </p:spPr>
-        <p:txBody>
-          <a:bodyPr wrap="square" rtlCol="0">
-            <a:spAutoFit/>
-          </a:bodyPr>
-          <a:lstStyle/>
-          <a:p>
-            <a:pPr algn="ctr"/>
-            <a:r>
-              <a:rPr lang="en-US"/>
-              <a:t>Original                               -&gt; add multisess date -&gt;                        apply vis strict filter (using </a:t>
-            </a:r>
-            <a:r>
-              <a:rPr lang="en-US" err="1"/>
-              <a:t>pval</a:t>
-            </a:r>
-            <a:r>
-              <a:rPr lang="en-US"/>
-              <a:t> &lt; </a:t>
-            </a:r>
-            <a:r>
-              <a:rPr lang="en-US" err="1"/>
-              <a:t>p_bonf</a:t>
-            </a:r>
-            <a:r>
-              <a:rPr lang="en-US"/>
-              <a:t>)</a:t>
-            </a:r>
-          </a:p>
-        </p:txBody>
-      </p:sp>
       <p:pic>
         <p:nvPicPr>
-          <p:cNvPr id="3" name="Picture 2">
-            <a:extLst>
-              <a:ext uri="{FF2B5EF4-FFF2-40B4-BE49-F238E27FC236}">
-                <a16:creationId xmlns:a16="http://schemas.microsoft.com/office/drawing/2014/main" id="{4B2BE6C7-8449-4135-A4BE-083ED801AD30}"/>
+          <p:cNvPr id="2" name="Picture 1">
+            <a:extLst>
+              <a:ext uri="{FF2B5EF4-FFF2-40B4-BE49-F238E27FC236}">
+                <a16:creationId xmlns:a16="http://schemas.microsoft.com/office/drawing/2014/main" id="{659C7EA7-0DEE-4A75-B893-DBCB6204A2D9}"/>
               </a:ext>
             </a:extLst>
           </p:cNvPr>
@@ -3747,20 +3698,72 @@
         </p:blipFill>
         <p:spPr>
           <a:xfrm>
-            <a:off x="3904958" y="2687605"/>
-            <a:ext cx="3038475" cy="2247900"/>
+            <a:off x="668830" y="2506899"/>
+            <a:ext cx="2640904" cy="2181225"/>
           </a:xfrm>
           <a:prstGeom prst="rect">
             <a:avLst/>
           </a:prstGeom>
         </p:spPr>
       </p:pic>
+      <p:sp>
+        <p:nvSpPr>
+          <p:cNvPr id="4" name="TextBox 3">
+            <a:extLst>
+              <a:ext uri="{FF2B5EF4-FFF2-40B4-BE49-F238E27FC236}">
+                <a16:creationId xmlns:a16="http://schemas.microsoft.com/office/drawing/2014/main" id="{3A562206-B9E3-4A3D-8B8D-47F0222F55A6}"/>
+              </a:ext>
+            </a:extLst>
+          </p:cNvPr>
+          <p:cNvSpPr txBox="1"/>
+          <p:nvPr/>
+        </p:nvSpPr>
+        <p:spPr>
+          <a:xfrm>
+            <a:off x="1772816" y="1270093"/>
+            <a:ext cx="9974424" cy="369332"/>
+          </a:xfrm>
+          <a:prstGeom prst="rect">
+            <a:avLst/>
+          </a:prstGeom>
+          <a:noFill/>
+        </p:spPr>
+        <p:txBody>
+          <a:bodyPr wrap="square" rtlCol="0">
+            <a:spAutoFit/>
+          </a:bodyPr>
+          <a:lstStyle/>
+          <a:p>
+            <a:pPr algn="ctr"/>
+            <a:r>
+              <a:rPr lang="en-US"/>
+              <a:t>Original                               -&gt; add multisess date -&gt;                        apply vis strict filter (using </a:t>
+            </a:r>
+            <a:r>
+              <a:rPr lang="en-US" err="1"/>
+              <a:t>pval</a:t>
+            </a:r>
+            <a:r>
+              <a:rPr lang="en-US"/>
+              <a:t> &lt; </a:t>
+            </a:r>
+            <a:r>
+              <a:rPr lang="en-US" err="1"/>
+              <a:t>p_bonf</a:t>
+            </a:r>
+            <a:r>
+              <a:rPr lang="en-US"/>
+              <a:t>)</a:t>
+            </a:r>
+          </a:p>
+        </p:txBody>
+      </p:sp>
       <p:pic>
         <p:nvPicPr>
-          <p:cNvPr id="4" name="Picture 3">
-            <a:extLst>
-              <a:ext uri="{FF2B5EF4-FFF2-40B4-BE49-F238E27FC236}">
-                <a16:creationId xmlns:a16="http://schemas.microsoft.com/office/drawing/2014/main" id="{301754D8-8DD9-4284-A082-55630AC9F625}"/>
+          <p:cNvPr id="5" name="Picture 4">
+            <a:extLst>
+              <a:ext uri="{FF2B5EF4-FFF2-40B4-BE49-F238E27FC236}">
+                <a16:creationId xmlns:a16="http://schemas.microsoft.com/office/drawing/2014/main" id="{D0DAC29F-94CF-4557-8C8C-B5F0A03C3934}"/>
               </a:ext>
             </a:extLst>
           </p:cNvPr>
@@ -3777,8 +3780,8 @@
         </p:blipFill>
         <p:spPr>
           <a:xfrm>
-            <a:off x="756946" y="2687605"/>
-            <a:ext cx="2933700" cy="2247900"/>
+            <a:off x="4129476" y="2468799"/>
+            <a:ext cx="2981325" cy="2219325"/>
           </a:xfrm>
           <a:prstGeom prst="rect">
             <a:avLst/>
@@ -3787,10 +3790,10 @@
       </p:pic>
       <p:pic>
         <p:nvPicPr>
-          <p:cNvPr id="5" name="Picture 4">
-            <a:extLst>
-              <a:ext uri="{FF2B5EF4-FFF2-40B4-BE49-F238E27FC236}">
-                <a16:creationId xmlns:a16="http://schemas.microsoft.com/office/drawing/2014/main" id="{4250141F-D502-4353-8DE1-30267ECBA760}"/>
+          <p:cNvPr id="6" name="Picture 5">
+            <a:extLst>
+              <a:ext uri="{FF2B5EF4-FFF2-40B4-BE49-F238E27FC236}">
+                <a16:creationId xmlns:a16="http://schemas.microsoft.com/office/drawing/2014/main" id="{1829F070-194C-402C-B5BF-41E6FE96B4E1}"/>
               </a:ext>
             </a:extLst>
           </p:cNvPr>
@@ -3807,8 +3810,8 @@
         </p:blipFill>
         <p:spPr>
           <a:xfrm>
-            <a:off x="8224643" y="2630455"/>
-            <a:ext cx="3076575" cy="2362200"/>
+            <a:off x="8385790" y="2506899"/>
+            <a:ext cx="2828925" cy="2190750"/>
           </a:xfrm>
           <a:prstGeom prst="rect">
             <a:avLst/>
@@ -3818,7 +3821,7 @@
     </p:spTree>
     <p:extLst>
       <p:ext uri="{BB962C8B-B14F-4D97-AF65-F5344CB8AC3E}">
-        <p14:creationId xmlns:p14="http://schemas.microsoft.com/office/powerpoint/2010/main" val="1213322900"/>
+        <p14:creationId xmlns:p14="http://schemas.microsoft.com/office/powerpoint/2010/main" val="2333572131"/>
       </p:ext>
     </p:extLst>
   </p:cSld>
@@ -3850,7 +3853,7 @@
           <p:cNvPr id="2" name="Picture 1">
             <a:extLst>
               <a:ext uri="{FF2B5EF4-FFF2-40B4-BE49-F238E27FC236}">
-                <a16:creationId xmlns:a16="http://schemas.microsoft.com/office/drawing/2014/main" id="{659C7EA7-0DEE-4A75-B893-DBCB6204A2D9}"/>
+                <a16:creationId xmlns:a16="http://schemas.microsoft.com/office/drawing/2014/main" id="{EBFC13A4-D18E-42A5-B39C-931D54413D8B}"/>
               </a:ext>
             </a:extLst>
           </p:cNvPr>
@@ -3867,8 +3870,8 @@
         </p:blipFill>
         <p:spPr>
           <a:xfrm>
-            <a:off x="668830" y="2506899"/>
-            <a:ext cx="2640904" cy="2181225"/>
+            <a:off x="653532" y="2453562"/>
+            <a:ext cx="3009900" cy="2324100"/>
           </a:xfrm>
           <a:prstGeom prst="rect">
             <a:avLst/>
@@ -3880,7 +3883,7 @@
           <p:cNvPr id="3" name="Picture 2">
             <a:extLst>
               <a:ext uri="{FF2B5EF4-FFF2-40B4-BE49-F238E27FC236}">
-                <a16:creationId xmlns:a16="http://schemas.microsoft.com/office/drawing/2014/main" id="{3C0742E3-8216-4FAB-9861-BB400186FE9A}"/>
+                <a16:creationId xmlns:a16="http://schemas.microsoft.com/office/drawing/2014/main" id="{FD82408C-9B95-468A-9035-44505D64643D}"/>
               </a:ext>
             </a:extLst>
           </p:cNvPr>
@@ -3897,8 +3900,8 @@
         </p:blipFill>
         <p:spPr>
           <a:xfrm>
-            <a:off x="3921773" y="2338387"/>
-            <a:ext cx="2762250" cy="2181225"/>
+            <a:off x="4259132" y="2444037"/>
+            <a:ext cx="3076575" cy="2333625"/>
           </a:xfrm>
           <a:prstGeom prst="rect">
             <a:avLst/>
@@ -3910,7 +3913,7 @@
           <p:cNvPr id="4" name="TextBox 3">
             <a:extLst>
               <a:ext uri="{FF2B5EF4-FFF2-40B4-BE49-F238E27FC236}">
-                <a16:creationId xmlns:a16="http://schemas.microsoft.com/office/drawing/2014/main" id="{3A562206-B9E3-4A3D-8B8D-47F0222F55A6}"/>
+                <a16:creationId xmlns:a16="http://schemas.microsoft.com/office/drawing/2014/main" id="{395E8ECC-A186-4B9B-8AF4-5881938F4C95}"/>
               </a:ext>
             </a:extLst>
           </p:cNvPr>
@@ -3957,10 +3960,736 @@
           </a:p>
         </p:txBody>
       </p:sp>
+      <p:pic>
+        <p:nvPicPr>
+          <p:cNvPr id="5" name="Picture 4">
+            <a:extLst>
+              <a:ext uri="{FF2B5EF4-FFF2-40B4-BE49-F238E27FC236}">
+                <a16:creationId xmlns:a16="http://schemas.microsoft.com/office/drawing/2014/main" id="{E6E2B750-45CA-4CFE-95A1-B0AB6F6332D3}"/>
+              </a:ext>
+            </a:extLst>
+          </p:cNvPr>
+          <p:cNvPicPr>
+            <a:picLocks noChangeAspect="1"/>
+          </p:cNvPicPr>
+          <p:nvPr/>
+        </p:nvPicPr>
+        <p:blipFill>
+          <a:blip r:embed="rId4"/>
+          <a:stretch>
+            <a:fillRect/>
+          </a:stretch>
+        </p:blipFill>
+        <p:spPr>
+          <a:xfrm>
+            <a:off x="8232807" y="2377362"/>
+            <a:ext cx="3190875" cy="2400300"/>
+          </a:xfrm>
+          <a:prstGeom prst="rect">
+            <a:avLst/>
+          </a:prstGeom>
+        </p:spPr>
+      </p:pic>
     </p:spTree>
     <p:extLst>
       <p:ext uri="{BB962C8B-B14F-4D97-AF65-F5344CB8AC3E}">
-        <p14:creationId xmlns:p14="http://schemas.microsoft.com/office/powerpoint/2010/main" val="2333572131"/>
+        <p14:creationId xmlns:p14="http://schemas.microsoft.com/office/powerpoint/2010/main" val="2391894071"/>
+      </p:ext>
+    </p:extLst>
+  </p:cSld>
+  <p:clrMapOvr>
+    <a:masterClrMapping/>
+  </p:clrMapOvr>
+</p:sld>
+</file>
+
+<file path=ppt/slides/slide5.xml><?xml version="1.0" encoding="utf-8"?>
+<p:sld xmlns:a="http://schemas.openxmlformats.org/drawingml/2006/main" xmlns:r="http://schemas.openxmlformats.org/officeDocument/2006/relationships" xmlns:p="http://schemas.openxmlformats.org/presentationml/2006/main">
+  <p:cSld>
+    <p:spTree>
+      <p:nvGrpSpPr>
+        <p:cNvPr id="1" name=""/>
+        <p:cNvGrpSpPr/>
+        <p:nvPr/>
+      </p:nvGrpSpPr>
+      <p:grpSpPr>
+        <a:xfrm>
+          <a:off x="0" y="0"/>
+          <a:ext cx="0" cy="0"/>
+          <a:chOff x="0" y="0"/>
+          <a:chExt cx="0" cy="0"/>
+        </a:xfrm>
+      </p:grpSpPr>
+      <p:pic>
+        <p:nvPicPr>
+          <p:cNvPr id="2" name="Picture 1">
+            <a:extLst>
+              <a:ext uri="{FF2B5EF4-FFF2-40B4-BE49-F238E27FC236}">
+                <a16:creationId xmlns:a16="http://schemas.microsoft.com/office/drawing/2014/main" id="{ED6C0D15-61E6-49CB-BACE-C635998283CC}"/>
+              </a:ext>
+            </a:extLst>
+          </p:cNvPr>
+          <p:cNvPicPr>
+            <a:picLocks noChangeAspect="1"/>
+          </p:cNvPicPr>
+          <p:nvPr/>
+        </p:nvPicPr>
+        <p:blipFill>
+          <a:blip r:embed="rId2"/>
+          <a:stretch>
+            <a:fillRect/>
+          </a:stretch>
+        </p:blipFill>
+        <p:spPr>
+          <a:xfrm>
+            <a:off x="4101289" y="2295525"/>
+            <a:ext cx="3000375" cy="2266950"/>
+          </a:xfrm>
+          <a:prstGeom prst="rect">
+            <a:avLst/>
+          </a:prstGeom>
+        </p:spPr>
+      </p:pic>
+      <p:sp>
+        <p:nvSpPr>
+          <p:cNvPr id="3" name="TextBox 2">
+            <a:extLst>
+              <a:ext uri="{FF2B5EF4-FFF2-40B4-BE49-F238E27FC236}">
+                <a16:creationId xmlns:a16="http://schemas.microsoft.com/office/drawing/2014/main" id="{42D3425D-7D9D-4A00-B5A2-B5754787F753}"/>
+              </a:ext>
+            </a:extLst>
+          </p:cNvPr>
+          <p:cNvSpPr txBox="1"/>
+          <p:nvPr/>
+        </p:nvSpPr>
+        <p:spPr>
+          <a:xfrm>
+            <a:off x="1772816" y="1270093"/>
+            <a:ext cx="9974424" cy="369332"/>
+          </a:xfrm>
+          <a:prstGeom prst="rect">
+            <a:avLst/>
+          </a:prstGeom>
+          <a:noFill/>
+        </p:spPr>
+        <p:txBody>
+          <a:bodyPr wrap="square" rtlCol="0">
+            <a:spAutoFit/>
+          </a:bodyPr>
+          <a:lstStyle/>
+          <a:p>
+            <a:pPr algn="ctr"/>
+            <a:r>
+              <a:rPr lang="en-US"/>
+              <a:t>Original                               -&gt; add multisess date -&gt;                        apply vis strict filter (using </a:t>
+            </a:r>
+            <a:r>
+              <a:rPr lang="en-US" err="1"/>
+              <a:t>pval</a:t>
+            </a:r>
+            <a:r>
+              <a:rPr lang="en-US"/>
+              <a:t> &lt; </a:t>
+            </a:r>
+            <a:r>
+              <a:rPr lang="en-US" err="1"/>
+              <a:t>p_bonf</a:t>
+            </a:r>
+            <a:r>
+              <a:rPr lang="en-US"/>
+              <a:t>)</a:t>
+            </a:r>
+          </a:p>
+        </p:txBody>
+      </p:sp>
+      <p:pic>
+        <p:nvPicPr>
+          <p:cNvPr id="4" name="Picture 3">
+            <a:extLst>
+              <a:ext uri="{FF2B5EF4-FFF2-40B4-BE49-F238E27FC236}">
+                <a16:creationId xmlns:a16="http://schemas.microsoft.com/office/drawing/2014/main" id="{CF8B61E3-0EAB-472D-BAD4-9E7B10509760}"/>
+              </a:ext>
+            </a:extLst>
+          </p:cNvPr>
+          <p:cNvPicPr>
+            <a:picLocks noChangeAspect="1"/>
+          </p:cNvPicPr>
+          <p:nvPr/>
+        </p:nvPicPr>
+        <p:blipFill>
+          <a:blip r:embed="rId3"/>
+          <a:stretch>
+            <a:fillRect/>
+          </a:stretch>
+        </p:blipFill>
+        <p:spPr>
+          <a:xfrm>
+            <a:off x="7959012" y="2247900"/>
+            <a:ext cx="3048000" cy="2314575"/>
+          </a:xfrm>
+          <a:prstGeom prst="rect">
+            <a:avLst/>
+          </a:prstGeom>
+        </p:spPr>
+      </p:pic>
+      <p:pic>
+        <p:nvPicPr>
+          <p:cNvPr id="5" name="Picture 4">
+            <a:extLst>
+              <a:ext uri="{FF2B5EF4-FFF2-40B4-BE49-F238E27FC236}">
+                <a16:creationId xmlns:a16="http://schemas.microsoft.com/office/drawing/2014/main" id="{2007D493-9151-42EF-9D18-6B144BA052DC}"/>
+              </a:ext>
+            </a:extLst>
+          </p:cNvPr>
+          <p:cNvPicPr>
+            <a:picLocks noChangeAspect="1"/>
+          </p:cNvPicPr>
+          <p:nvPr/>
+        </p:nvPicPr>
+        <p:blipFill>
+          <a:blip r:embed="rId4"/>
+          <a:stretch>
+            <a:fillRect/>
+          </a:stretch>
+        </p:blipFill>
+        <p:spPr>
+          <a:xfrm>
+            <a:off x="652365" y="2247900"/>
+            <a:ext cx="3124200" cy="2305050"/>
+          </a:xfrm>
+          <a:prstGeom prst="rect">
+            <a:avLst/>
+          </a:prstGeom>
+        </p:spPr>
+      </p:pic>
+    </p:spTree>
+    <p:extLst>
+      <p:ext uri="{BB962C8B-B14F-4D97-AF65-F5344CB8AC3E}">
+        <p14:creationId xmlns:p14="http://schemas.microsoft.com/office/powerpoint/2010/main" val="536166109"/>
+      </p:ext>
+    </p:extLst>
+  </p:cSld>
+  <p:clrMapOvr>
+    <a:masterClrMapping/>
+  </p:clrMapOvr>
+</p:sld>
+</file>
+
+<file path=ppt/slides/slide6.xml><?xml version="1.0" encoding="utf-8"?>
+<p:sld xmlns:a="http://schemas.openxmlformats.org/drawingml/2006/main" xmlns:r="http://schemas.openxmlformats.org/officeDocument/2006/relationships" xmlns:p="http://schemas.openxmlformats.org/presentationml/2006/main">
+  <p:cSld>
+    <p:spTree>
+      <p:nvGrpSpPr>
+        <p:cNvPr id="1" name=""/>
+        <p:cNvGrpSpPr/>
+        <p:nvPr/>
+      </p:nvGrpSpPr>
+      <p:grpSpPr>
+        <a:xfrm>
+          <a:off x="0" y="0"/>
+          <a:ext cx="0" cy="0"/>
+          <a:chOff x="0" y="0"/>
+          <a:chExt cx="0" cy="0"/>
+        </a:xfrm>
+      </p:grpSpPr>
+      <p:pic>
+        <p:nvPicPr>
+          <p:cNvPr id="2" name="Picture 1">
+            <a:extLst>
+              <a:ext uri="{FF2B5EF4-FFF2-40B4-BE49-F238E27FC236}">
+                <a16:creationId xmlns:a16="http://schemas.microsoft.com/office/drawing/2014/main" id="{36C9AC4A-4D2E-4D71-985D-4636D2BBEBB8}"/>
+              </a:ext>
+            </a:extLst>
+          </p:cNvPr>
+          <p:cNvPicPr>
+            <a:picLocks noChangeAspect="1"/>
+          </p:cNvPicPr>
+          <p:nvPr/>
+        </p:nvPicPr>
+        <p:blipFill>
+          <a:blip r:embed="rId2"/>
+          <a:stretch>
+            <a:fillRect/>
+          </a:stretch>
+        </p:blipFill>
+        <p:spPr>
+          <a:xfrm>
+            <a:off x="1288986" y="2256452"/>
+            <a:ext cx="2000250" cy="1524000"/>
+          </a:xfrm>
+          <a:prstGeom prst="rect">
+            <a:avLst/>
+          </a:prstGeom>
+        </p:spPr>
+      </p:pic>
+      <p:sp>
+        <p:nvSpPr>
+          <p:cNvPr id="3" name="TextBox 2">
+            <a:extLst>
+              <a:ext uri="{FF2B5EF4-FFF2-40B4-BE49-F238E27FC236}">
+                <a16:creationId xmlns:a16="http://schemas.microsoft.com/office/drawing/2014/main" id="{F2A2D297-06D7-49AC-B345-D165ECAC3EEB}"/>
+              </a:ext>
+            </a:extLst>
+          </p:cNvPr>
+          <p:cNvSpPr txBox="1"/>
+          <p:nvPr/>
+        </p:nvSpPr>
+        <p:spPr>
+          <a:xfrm>
+            <a:off x="1772816" y="1270093"/>
+            <a:ext cx="9974424" cy="369332"/>
+          </a:xfrm>
+          <a:prstGeom prst="rect">
+            <a:avLst/>
+          </a:prstGeom>
+          <a:noFill/>
+        </p:spPr>
+        <p:txBody>
+          <a:bodyPr wrap="square" rtlCol="0">
+            <a:spAutoFit/>
+          </a:bodyPr>
+          <a:lstStyle/>
+          <a:p>
+            <a:pPr algn="ctr"/>
+            <a:r>
+              <a:rPr lang="en-US"/>
+              <a:t>Original                               -&gt; add multisess date -&gt;                        apply vis strict filter (using </a:t>
+            </a:r>
+            <a:r>
+              <a:rPr lang="en-US" err="1"/>
+              <a:t>pval</a:t>
+            </a:r>
+            <a:r>
+              <a:rPr lang="en-US"/>
+              <a:t> &lt; </a:t>
+            </a:r>
+            <a:r>
+              <a:rPr lang="en-US" err="1"/>
+              <a:t>p_bonf</a:t>
+            </a:r>
+            <a:r>
+              <a:rPr lang="en-US"/>
+              <a:t>)</a:t>
+            </a:r>
+          </a:p>
+        </p:txBody>
+      </p:sp>
+      <p:pic>
+        <p:nvPicPr>
+          <p:cNvPr id="4" name="Picture 3">
+            <a:extLst>
+              <a:ext uri="{FF2B5EF4-FFF2-40B4-BE49-F238E27FC236}">
+                <a16:creationId xmlns:a16="http://schemas.microsoft.com/office/drawing/2014/main" id="{795469BC-0E71-45A9-BCFC-1F09D2C8384E}"/>
+              </a:ext>
+            </a:extLst>
+          </p:cNvPr>
+          <p:cNvPicPr>
+            <a:picLocks noChangeAspect="1"/>
+          </p:cNvPicPr>
+          <p:nvPr/>
+        </p:nvPicPr>
+        <p:blipFill>
+          <a:blip r:embed="rId3"/>
+          <a:stretch>
+            <a:fillRect/>
+          </a:stretch>
+        </p:blipFill>
+        <p:spPr>
+          <a:xfrm>
+            <a:off x="4067369" y="2256452"/>
+            <a:ext cx="2209800" cy="1571625"/>
+          </a:xfrm>
+          <a:prstGeom prst="rect">
+            <a:avLst/>
+          </a:prstGeom>
+        </p:spPr>
+      </p:pic>
+      <p:pic>
+        <p:nvPicPr>
+          <p:cNvPr id="5" name="Picture 4">
+            <a:extLst>
+              <a:ext uri="{FF2B5EF4-FFF2-40B4-BE49-F238E27FC236}">
+                <a16:creationId xmlns:a16="http://schemas.microsoft.com/office/drawing/2014/main" id="{FDEF4B49-3369-462C-BC73-49D455F04C0A}"/>
+              </a:ext>
+            </a:extLst>
+          </p:cNvPr>
+          <p:cNvPicPr>
+            <a:picLocks noChangeAspect="1"/>
+          </p:cNvPicPr>
+          <p:nvPr/>
+        </p:nvPicPr>
+        <p:blipFill>
+          <a:blip r:embed="rId4"/>
+          <a:stretch>
+            <a:fillRect/>
+          </a:stretch>
+        </p:blipFill>
+        <p:spPr>
+          <a:xfrm>
+            <a:off x="1279461" y="4196054"/>
+            <a:ext cx="2009775" cy="1638300"/>
+          </a:xfrm>
+          <a:prstGeom prst="rect">
+            <a:avLst/>
+          </a:prstGeom>
+        </p:spPr>
+      </p:pic>
+      <p:pic>
+        <p:nvPicPr>
+          <p:cNvPr id="7" name="Picture 6">
+            <a:extLst>
+              <a:ext uri="{FF2B5EF4-FFF2-40B4-BE49-F238E27FC236}">
+                <a16:creationId xmlns:a16="http://schemas.microsoft.com/office/drawing/2014/main" id="{455B3441-1895-4213-A3C9-71E17B137656}"/>
+              </a:ext>
+            </a:extLst>
+          </p:cNvPr>
+          <p:cNvPicPr>
+            <a:picLocks noChangeAspect="1"/>
+          </p:cNvPicPr>
+          <p:nvPr/>
+        </p:nvPicPr>
+        <p:blipFill>
+          <a:blip r:embed="rId5"/>
+          <a:stretch>
+            <a:fillRect/>
+          </a:stretch>
+        </p:blipFill>
+        <p:spPr>
+          <a:xfrm>
+            <a:off x="8428069" y="4281779"/>
+            <a:ext cx="2047875" cy="1552575"/>
+          </a:xfrm>
+          <a:prstGeom prst="rect">
+            <a:avLst/>
+          </a:prstGeom>
+        </p:spPr>
+      </p:pic>
+      <p:pic>
+        <p:nvPicPr>
+          <p:cNvPr id="8" name="Picture 7">
+            <a:extLst>
+              <a:ext uri="{FF2B5EF4-FFF2-40B4-BE49-F238E27FC236}">
+                <a16:creationId xmlns:a16="http://schemas.microsoft.com/office/drawing/2014/main" id="{93648654-86CC-4808-A255-752638B1AB8A}"/>
+              </a:ext>
+            </a:extLst>
+          </p:cNvPr>
+          <p:cNvPicPr>
+            <a:picLocks noChangeAspect="1"/>
+          </p:cNvPicPr>
+          <p:nvPr/>
+        </p:nvPicPr>
+        <p:blipFill>
+          <a:blip r:embed="rId6"/>
+          <a:stretch>
+            <a:fillRect/>
+          </a:stretch>
+        </p:blipFill>
+        <p:spPr>
+          <a:xfrm>
+            <a:off x="4238819" y="4224629"/>
+            <a:ext cx="2038350" cy="1581150"/>
+          </a:xfrm>
+          <a:prstGeom prst="rect">
+            <a:avLst/>
+          </a:prstGeom>
+        </p:spPr>
+      </p:pic>
+      <p:pic>
+        <p:nvPicPr>
+          <p:cNvPr id="9" name="Picture 8">
+            <a:extLst>
+              <a:ext uri="{FF2B5EF4-FFF2-40B4-BE49-F238E27FC236}">
+                <a16:creationId xmlns:a16="http://schemas.microsoft.com/office/drawing/2014/main" id="{5E1CFE29-B42B-4BA4-B184-84AF8331F69E}"/>
+              </a:ext>
+            </a:extLst>
+          </p:cNvPr>
+          <p:cNvPicPr>
+            <a:picLocks noChangeAspect="1"/>
+          </p:cNvPicPr>
+          <p:nvPr/>
+        </p:nvPicPr>
+        <p:blipFill>
+          <a:blip r:embed="rId7"/>
+          <a:stretch>
+            <a:fillRect/>
+          </a:stretch>
+        </p:blipFill>
+        <p:spPr>
+          <a:xfrm>
+            <a:off x="8428069" y="2242164"/>
+            <a:ext cx="1971675" cy="1600200"/>
+          </a:xfrm>
+          <a:prstGeom prst="rect">
+            <a:avLst/>
+          </a:prstGeom>
+        </p:spPr>
+      </p:pic>
+    </p:spTree>
+    <p:extLst>
+      <p:ext uri="{BB962C8B-B14F-4D97-AF65-F5344CB8AC3E}">
+        <p14:creationId xmlns:p14="http://schemas.microsoft.com/office/powerpoint/2010/main" val="49514628"/>
+      </p:ext>
+    </p:extLst>
+  </p:cSld>
+  <p:clrMapOvr>
+    <a:masterClrMapping/>
+  </p:clrMapOvr>
+</p:sld>
+</file>
+
+<file path=ppt/slides/slide7.xml><?xml version="1.0" encoding="utf-8"?>
+<p:sld xmlns:a="http://schemas.openxmlformats.org/drawingml/2006/main" xmlns:r="http://schemas.openxmlformats.org/officeDocument/2006/relationships" xmlns:p="http://schemas.openxmlformats.org/presentationml/2006/main">
+  <p:cSld>
+    <p:spTree>
+      <p:nvGrpSpPr>
+        <p:cNvPr id="1" name=""/>
+        <p:cNvGrpSpPr/>
+        <p:nvPr/>
+      </p:nvGrpSpPr>
+      <p:grpSpPr>
+        <a:xfrm>
+          <a:off x="0" y="0"/>
+          <a:ext cx="0" cy="0"/>
+          <a:chOff x="0" y="0"/>
+          <a:chExt cx="0" cy="0"/>
+        </a:xfrm>
+      </p:grpSpPr>
+      <p:sp>
+        <p:nvSpPr>
+          <p:cNvPr id="2" name="TextBox 1">
+            <a:extLst>
+              <a:ext uri="{FF2B5EF4-FFF2-40B4-BE49-F238E27FC236}">
+                <a16:creationId xmlns:a16="http://schemas.microsoft.com/office/drawing/2014/main" id="{F2B08F04-FA66-4008-A57F-38AB4BDD5454}"/>
+              </a:ext>
+            </a:extLst>
+          </p:cNvPr>
+          <p:cNvSpPr txBox="1"/>
+          <p:nvPr/>
+        </p:nvSpPr>
+        <p:spPr>
+          <a:xfrm>
+            <a:off x="1772816" y="1270093"/>
+            <a:ext cx="9974424" cy="369332"/>
+          </a:xfrm>
+          <a:prstGeom prst="rect">
+            <a:avLst/>
+          </a:prstGeom>
+          <a:noFill/>
+        </p:spPr>
+        <p:txBody>
+          <a:bodyPr wrap="square" rtlCol="0">
+            <a:spAutoFit/>
+          </a:bodyPr>
+          <a:lstStyle/>
+          <a:p>
+            <a:pPr algn="ctr"/>
+            <a:r>
+              <a:rPr lang="en-US"/>
+              <a:t>Original                               -&gt; add multisess date -&gt;                        apply vis strict filter (using </a:t>
+            </a:r>
+            <a:r>
+              <a:rPr lang="en-US" err="1"/>
+              <a:t>pval</a:t>
+            </a:r>
+            <a:r>
+              <a:rPr lang="en-US"/>
+              <a:t> &lt; </a:t>
+            </a:r>
+            <a:r>
+              <a:rPr lang="en-US" err="1"/>
+              <a:t>p_bonf</a:t>
+            </a:r>
+            <a:r>
+              <a:rPr lang="en-US"/>
+              <a:t>)</a:t>
+            </a:r>
+          </a:p>
+        </p:txBody>
+      </p:sp>
+      <p:pic>
+        <p:nvPicPr>
+          <p:cNvPr id="3" name="Picture 2">
+            <a:extLst>
+              <a:ext uri="{FF2B5EF4-FFF2-40B4-BE49-F238E27FC236}">
+                <a16:creationId xmlns:a16="http://schemas.microsoft.com/office/drawing/2014/main" id="{01298C22-CA7D-4E27-833B-0206E1BB515B}"/>
+              </a:ext>
+            </a:extLst>
+          </p:cNvPr>
+          <p:cNvPicPr>
+            <a:picLocks noChangeAspect="1"/>
+          </p:cNvPicPr>
+          <p:nvPr/>
+        </p:nvPicPr>
+        <p:blipFill>
+          <a:blip r:embed="rId2"/>
+          <a:stretch>
+            <a:fillRect/>
+          </a:stretch>
+        </p:blipFill>
+        <p:spPr>
+          <a:xfrm>
+            <a:off x="1308035" y="1842504"/>
+            <a:ext cx="1962150" cy="1400175"/>
+          </a:xfrm>
+          <a:prstGeom prst="rect">
+            <a:avLst/>
+          </a:prstGeom>
+        </p:spPr>
+      </p:pic>
+      <p:pic>
+        <p:nvPicPr>
+          <p:cNvPr id="4" name="Picture 3">
+            <a:extLst>
+              <a:ext uri="{FF2B5EF4-FFF2-40B4-BE49-F238E27FC236}">
+                <a16:creationId xmlns:a16="http://schemas.microsoft.com/office/drawing/2014/main" id="{C2BAC057-64AF-4089-A372-32E747DA02C7}"/>
+              </a:ext>
+            </a:extLst>
+          </p:cNvPr>
+          <p:cNvPicPr>
+            <a:picLocks noChangeAspect="1"/>
+          </p:cNvPicPr>
+          <p:nvPr/>
+        </p:nvPicPr>
+        <p:blipFill>
+          <a:blip r:embed="rId3"/>
+          <a:stretch>
+            <a:fillRect/>
+          </a:stretch>
+        </p:blipFill>
+        <p:spPr>
+          <a:xfrm>
+            <a:off x="4490357" y="1832979"/>
+            <a:ext cx="1905000" cy="1409700"/>
+          </a:xfrm>
+          <a:prstGeom prst="rect">
+            <a:avLst/>
+          </a:prstGeom>
+        </p:spPr>
+      </p:pic>
+      <p:pic>
+        <p:nvPicPr>
+          <p:cNvPr id="5" name="Picture 4">
+            <a:extLst>
+              <a:ext uri="{FF2B5EF4-FFF2-40B4-BE49-F238E27FC236}">
+                <a16:creationId xmlns:a16="http://schemas.microsoft.com/office/drawing/2014/main" id="{30CAFDFF-C81F-4104-BDD7-5A3C096A8389}"/>
+              </a:ext>
+            </a:extLst>
+          </p:cNvPr>
+          <p:cNvPicPr>
+            <a:picLocks noChangeAspect="1"/>
+          </p:cNvPicPr>
+          <p:nvPr/>
+        </p:nvPicPr>
+        <p:blipFill>
+          <a:blip r:embed="rId4"/>
+          <a:stretch>
+            <a:fillRect/>
+          </a:stretch>
+        </p:blipFill>
+        <p:spPr>
+          <a:xfrm>
+            <a:off x="1327085" y="3811846"/>
+            <a:ext cx="1924050" cy="1343025"/>
+          </a:xfrm>
+          <a:prstGeom prst="rect">
+            <a:avLst/>
+          </a:prstGeom>
+        </p:spPr>
+      </p:pic>
+      <p:pic>
+        <p:nvPicPr>
+          <p:cNvPr id="6" name="Picture 5">
+            <a:extLst>
+              <a:ext uri="{FF2B5EF4-FFF2-40B4-BE49-F238E27FC236}">
+                <a16:creationId xmlns:a16="http://schemas.microsoft.com/office/drawing/2014/main" id="{D4B01A8D-CA30-4A92-9D41-DA2A777113F5}"/>
+              </a:ext>
+            </a:extLst>
+          </p:cNvPr>
+          <p:cNvPicPr>
+            <a:picLocks noChangeAspect="1"/>
+          </p:cNvPicPr>
+          <p:nvPr/>
+        </p:nvPicPr>
+        <p:blipFill>
+          <a:blip r:embed="rId5"/>
+          <a:stretch>
+            <a:fillRect/>
+          </a:stretch>
+        </p:blipFill>
+        <p:spPr>
+          <a:xfrm>
+            <a:off x="4509407" y="3716596"/>
+            <a:ext cx="1866900" cy="1438275"/>
+          </a:xfrm>
+          <a:prstGeom prst="rect">
+            <a:avLst/>
+          </a:prstGeom>
+        </p:spPr>
+      </p:pic>
+      <p:pic>
+        <p:nvPicPr>
+          <p:cNvPr id="7" name="Picture 6">
+            <a:extLst>
+              <a:ext uri="{FF2B5EF4-FFF2-40B4-BE49-F238E27FC236}">
+                <a16:creationId xmlns:a16="http://schemas.microsoft.com/office/drawing/2014/main" id="{6B7A28E1-8414-4F76-8729-15097EE4DC99}"/>
+              </a:ext>
+            </a:extLst>
+          </p:cNvPr>
+          <p:cNvPicPr>
+            <a:picLocks noChangeAspect="1"/>
+          </p:cNvPicPr>
+          <p:nvPr/>
+        </p:nvPicPr>
+        <p:blipFill>
+          <a:blip r:embed="rId6"/>
+          <a:stretch>
+            <a:fillRect/>
+          </a:stretch>
+        </p:blipFill>
+        <p:spPr>
+          <a:xfrm>
+            <a:off x="8688355" y="1823454"/>
+            <a:ext cx="1981200" cy="1419225"/>
+          </a:xfrm>
+          <a:prstGeom prst="rect">
+            <a:avLst/>
+          </a:prstGeom>
+        </p:spPr>
+      </p:pic>
+      <p:pic>
+        <p:nvPicPr>
+          <p:cNvPr id="8" name="Picture 7">
+            <a:extLst>
+              <a:ext uri="{FF2B5EF4-FFF2-40B4-BE49-F238E27FC236}">
+                <a16:creationId xmlns:a16="http://schemas.microsoft.com/office/drawing/2014/main" id="{8C9A560B-7C0F-49E0-A023-456504501FE1}"/>
+              </a:ext>
+            </a:extLst>
+          </p:cNvPr>
+          <p:cNvPicPr>
+            <a:picLocks noChangeAspect="1"/>
+          </p:cNvPicPr>
+          <p:nvPr/>
+        </p:nvPicPr>
+        <p:blipFill>
+          <a:blip r:embed="rId7"/>
+          <a:stretch>
+            <a:fillRect/>
+          </a:stretch>
+        </p:blipFill>
+        <p:spPr>
+          <a:xfrm>
+            <a:off x="8688355" y="3792796"/>
+            <a:ext cx="1914525" cy="1362075"/>
+          </a:xfrm>
+          <a:prstGeom prst="rect">
+            <a:avLst/>
+          </a:prstGeom>
+        </p:spPr>
+      </p:pic>
+    </p:spTree>
+    <p:extLst>
+      <p:ext uri="{BB962C8B-B14F-4D97-AF65-F5344CB8AC3E}">
+        <p14:creationId xmlns:p14="http://schemas.microsoft.com/office/powerpoint/2010/main" val="4147907477"/>
       </p:ext>
     </p:extLst>
   </p:cSld>

</xml_diff>

<commit_message>
rerun decorr with multisess date
</commit_message>
<xml_diff>
--- a/results/add 8ori_2isi_multisess, and apply vis strict filter/compare.pptx
+++ b/results/add 8ori_2isi_multisess, and apply vis strict filter/compare.pptx
@@ -12,6 +12,8 @@
     <p:sldId id="261" r:id="rId6"/>
     <p:sldId id="262" r:id="rId7"/>
     <p:sldId id="263" r:id="rId8"/>
+    <p:sldId id="264" r:id="rId9"/>
+    <p:sldId id="265" r:id="rId10"/>
   </p:sldIdLst>
   <p:sldSz cx="12192000" cy="6858000"/>
   <p:notesSz cx="6858000" cy="9144000"/>
@@ -4699,6 +4701,530 @@
 </p:sld>
 </file>
 
+<file path=ppt/slides/slide8.xml><?xml version="1.0" encoding="utf-8"?>
+<p:sld xmlns:a="http://schemas.openxmlformats.org/drawingml/2006/main" xmlns:r="http://schemas.openxmlformats.org/officeDocument/2006/relationships" xmlns:p="http://schemas.openxmlformats.org/presentationml/2006/main">
+  <p:cSld>
+    <p:spTree>
+      <p:nvGrpSpPr>
+        <p:cNvPr id="1" name=""/>
+        <p:cNvGrpSpPr/>
+        <p:nvPr/>
+      </p:nvGrpSpPr>
+      <p:grpSpPr>
+        <a:xfrm>
+          <a:off x="0" y="0"/>
+          <a:ext cx="0" cy="0"/>
+          <a:chOff x="0" y="0"/>
+          <a:chExt cx="0" cy="0"/>
+        </a:xfrm>
+      </p:grpSpPr>
+      <p:pic>
+        <p:nvPicPr>
+          <p:cNvPr id="2" name="Picture 1">
+            <a:extLst>
+              <a:ext uri="{FF2B5EF4-FFF2-40B4-BE49-F238E27FC236}">
+                <a16:creationId xmlns:a16="http://schemas.microsoft.com/office/drawing/2014/main" id="{FE09124F-54C7-4478-884B-C92645A8E87C}"/>
+              </a:ext>
+            </a:extLst>
+          </p:cNvPr>
+          <p:cNvPicPr>
+            <a:picLocks noChangeAspect="1"/>
+          </p:cNvPicPr>
+          <p:nvPr/>
+        </p:nvPicPr>
+        <p:blipFill>
+          <a:blip r:embed="rId2"/>
+          <a:stretch>
+            <a:fillRect/>
+          </a:stretch>
+        </p:blipFill>
+        <p:spPr>
+          <a:xfrm>
+            <a:off x="4495119" y="2229434"/>
+            <a:ext cx="1895475" cy="1428750"/>
+          </a:xfrm>
+          <a:prstGeom prst="rect">
+            <a:avLst/>
+          </a:prstGeom>
+        </p:spPr>
+      </p:pic>
+      <p:sp>
+        <p:nvSpPr>
+          <p:cNvPr id="3" name="TextBox 2">
+            <a:extLst>
+              <a:ext uri="{FF2B5EF4-FFF2-40B4-BE49-F238E27FC236}">
+                <a16:creationId xmlns:a16="http://schemas.microsoft.com/office/drawing/2014/main" id="{2FADE9C6-A35B-432E-87BD-B144E5EC4A4A}"/>
+              </a:ext>
+            </a:extLst>
+          </p:cNvPr>
+          <p:cNvSpPr txBox="1"/>
+          <p:nvPr/>
+        </p:nvSpPr>
+        <p:spPr>
+          <a:xfrm>
+            <a:off x="1772816" y="1270093"/>
+            <a:ext cx="9974424" cy="369332"/>
+          </a:xfrm>
+          <a:prstGeom prst="rect">
+            <a:avLst/>
+          </a:prstGeom>
+          <a:noFill/>
+        </p:spPr>
+        <p:txBody>
+          <a:bodyPr wrap="square" rtlCol="0">
+            <a:spAutoFit/>
+          </a:bodyPr>
+          <a:lstStyle/>
+          <a:p>
+            <a:pPr algn="ctr"/>
+            <a:r>
+              <a:rPr lang="en-US"/>
+              <a:t>Original                               -&gt; add multisess date -&gt;                        apply vis strict filter (using </a:t>
+            </a:r>
+            <a:r>
+              <a:rPr lang="en-US" err="1"/>
+              <a:t>pval</a:t>
+            </a:r>
+            <a:r>
+              <a:rPr lang="en-US"/>
+              <a:t> &lt; </a:t>
+            </a:r>
+            <a:r>
+              <a:rPr lang="en-US" err="1"/>
+              <a:t>p_bonf</a:t>
+            </a:r>
+            <a:r>
+              <a:rPr lang="en-US"/>
+              <a:t>)</a:t>
+            </a:r>
+          </a:p>
+        </p:txBody>
+      </p:sp>
+      <p:pic>
+        <p:nvPicPr>
+          <p:cNvPr id="4" name="Picture 3">
+            <a:extLst>
+              <a:ext uri="{FF2B5EF4-FFF2-40B4-BE49-F238E27FC236}">
+                <a16:creationId xmlns:a16="http://schemas.microsoft.com/office/drawing/2014/main" id="{878FA6BA-AC77-4E50-843D-D947B5163F78}"/>
+              </a:ext>
+            </a:extLst>
+          </p:cNvPr>
+          <p:cNvPicPr>
+            <a:picLocks noChangeAspect="1"/>
+          </p:cNvPicPr>
+          <p:nvPr/>
+        </p:nvPicPr>
+        <p:blipFill>
+          <a:blip r:embed="rId3"/>
+          <a:stretch>
+            <a:fillRect/>
+          </a:stretch>
+        </p:blipFill>
+        <p:spPr>
+          <a:xfrm>
+            <a:off x="4476069" y="4150410"/>
+            <a:ext cx="1914525" cy="1428750"/>
+          </a:xfrm>
+          <a:prstGeom prst="rect">
+            <a:avLst/>
+          </a:prstGeom>
+        </p:spPr>
+      </p:pic>
+      <p:pic>
+        <p:nvPicPr>
+          <p:cNvPr id="5" name="Picture 4">
+            <a:extLst>
+              <a:ext uri="{FF2B5EF4-FFF2-40B4-BE49-F238E27FC236}">
+                <a16:creationId xmlns:a16="http://schemas.microsoft.com/office/drawing/2014/main" id="{2C915DAA-8642-482B-B0FC-69A62D6F5D5A}"/>
+              </a:ext>
+            </a:extLst>
+          </p:cNvPr>
+          <p:cNvPicPr>
+            <a:picLocks noChangeAspect="1"/>
+          </p:cNvPicPr>
+          <p:nvPr/>
+        </p:nvPicPr>
+        <p:blipFill>
+          <a:blip r:embed="rId4"/>
+          <a:stretch>
+            <a:fillRect/>
+          </a:stretch>
+        </p:blipFill>
+        <p:spPr>
+          <a:xfrm>
+            <a:off x="1643937" y="2196096"/>
+            <a:ext cx="1962150" cy="1495425"/>
+          </a:xfrm>
+          <a:prstGeom prst="rect">
+            <a:avLst/>
+          </a:prstGeom>
+        </p:spPr>
+      </p:pic>
+      <p:pic>
+        <p:nvPicPr>
+          <p:cNvPr id="6" name="Picture 5">
+            <a:extLst>
+              <a:ext uri="{FF2B5EF4-FFF2-40B4-BE49-F238E27FC236}">
+                <a16:creationId xmlns:a16="http://schemas.microsoft.com/office/drawing/2014/main" id="{1C3C77A0-B59E-44C2-A6DA-D868A31BD4C0}"/>
+              </a:ext>
+            </a:extLst>
+          </p:cNvPr>
+          <p:cNvPicPr>
+            <a:picLocks noChangeAspect="1"/>
+          </p:cNvPicPr>
+          <p:nvPr/>
+        </p:nvPicPr>
+        <p:blipFill>
+          <a:blip r:embed="rId5"/>
+          <a:stretch>
+            <a:fillRect/>
+          </a:stretch>
+        </p:blipFill>
+        <p:spPr>
+          <a:xfrm>
+            <a:off x="1643937" y="4150410"/>
+            <a:ext cx="1962150" cy="1409700"/>
+          </a:xfrm>
+          <a:prstGeom prst="rect">
+            <a:avLst/>
+          </a:prstGeom>
+        </p:spPr>
+      </p:pic>
+      <p:pic>
+        <p:nvPicPr>
+          <p:cNvPr id="7" name="Picture 6">
+            <a:extLst>
+              <a:ext uri="{FF2B5EF4-FFF2-40B4-BE49-F238E27FC236}">
+                <a16:creationId xmlns:a16="http://schemas.microsoft.com/office/drawing/2014/main" id="{27814F81-6E75-4071-A946-0673E65DBC27}"/>
+              </a:ext>
+            </a:extLst>
+          </p:cNvPr>
+          <p:cNvPicPr>
+            <a:picLocks noChangeAspect="1"/>
+          </p:cNvPicPr>
+          <p:nvPr/>
+        </p:nvPicPr>
+        <p:blipFill>
+          <a:blip r:embed="rId6"/>
+          <a:stretch>
+            <a:fillRect/>
+          </a:stretch>
+        </p:blipFill>
+        <p:spPr>
+          <a:xfrm>
+            <a:off x="7279626" y="2229434"/>
+            <a:ext cx="1981200" cy="1428750"/>
+          </a:xfrm>
+          <a:prstGeom prst="rect">
+            <a:avLst/>
+          </a:prstGeom>
+        </p:spPr>
+      </p:pic>
+      <p:pic>
+        <p:nvPicPr>
+          <p:cNvPr id="8" name="Picture 7">
+            <a:extLst>
+              <a:ext uri="{FF2B5EF4-FFF2-40B4-BE49-F238E27FC236}">
+                <a16:creationId xmlns:a16="http://schemas.microsoft.com/office/drawing/2014/main" id="{A10B5387-855C-47E1-BEED-6B9458C3998F}"/>
+              </a:ext>
+            </a:extLst>
+          </p:cNvPr>
+          <p:cNvPicPr>
+            <a:picLocks noChangeAspect="1"/>
+          </p:cNvPicPr>
+          <p:nvPr/>
+        </p:nvPicPr>
+        <p:blipFill>
+          <a:blip r:embed="rId7"/>
+          <a:stretch>
+            <a:fillRect/>
+          </a:stretch>
+        </p:blipFill>
+        <p:spPr>
+          <a:xfrm>
+            <a:off x="7279626" y="4150410"/>
+            <a:ext cx="1952625" cy="1428750"/>
+          </a:xfrm>
+          <a:prstGeom prst="rect">
+            <a:avLst/>
+          </a:prstGeom>
+        </p:spPr>
+      </p:pic>
+    </p:spTree>
+    <p:extLst>
+      <p:ext uri="{BB962C8B-B14F-4D97-AF65-F5344CB8AC3E}">
+        <p14:creationId xmlns:p14="http://schemas.microsoft.com/office/powerpoint/2010/main" val="1661626608"/>
+      </p:ext>
+    </p:extLst>
+  </p:cSld>
+  <p:clrMapOvr>
+    <a:masterClrMapping/>
+  </p:clrMapOvr>
+</p:sld>
+</file>
+
+<file path=ppt/slides/slide9.xml><?xml version="1.0" encoding="utf-8"?>
+<p:sld xmlns:a="http://schemas.openxmlformats.org/drawingml/2006/main" xmlns:r="http://schemas.openxmlformats.org/officeDocument/2006/relationships" xmlns:p="http://schemas.openxmlformats.org/presentationml/2006/main">
+  <p:cSld>
+    <p:spTree>
+      <p:nvGrpSpPr>
+        <p:cNvPr id="1" name=""/>
+        <p:cNvGrpSpPr/>
+        <p:nvPr/>
+      </p:nvGrpSpPr>
+      <p:grpSpPr>
+        <a:xfrm>
+          <a:off x="0" y="0"/>
+          <a:ext cx="0" cy="0"/>
+          <a:chOff x="0" y="0"/>
+          <a:chExt cx="0" cy="0"/>
+        </a:xfrm>
+      </p:grpSpPr>
+      <p:sp>
+        <p:nvSpPr>
+          <p:cNvPr id="2" name="TextBox 1">
+            <a:extLst>
+              <a:ext uri="{FF2B5EF4-FFF2-40B4-BE49-F238E27FC236}">
+                <a16:creationId xmlns:a16="http://schemas.microsoft.com/office/drawing/2014/main" id="{8F623B21-2635-47CF-A2DF-220F9778D6E6}"/>
+              </a:ext>
+            </a:extLst>
+          </p:cNvPr>
+          <p:cNvSpPr txBox="1"/>
+          <p:nvPr/>
+        </p:nvSpPr>
+        <p:spPr>
+          <a:xfrm>
+            <a:off x="1772816" y="1270093"/>
+            <a:ext cx="9974424" cy="369332"/>
+          </a:xfrm>
+          <a:prstGeom prst="rect">
+            <a:avLst/>
+          </a:prstGeom>
+          <a:noFill/>
+        </p:spPr>
+        <p:txBody>
+          <a:bodyPr wrap="square" rtlCol="0">
+            <a:spAutoFit/>
+          </a:bodyPr>
+          <a:lstStyle/>
+          <a:p>
+            <a:pPr algn="ctr"/>
+            <a:r>
+              <a:rPr lang="en-US"/>
+              <a:t>Original                               -&gt; add multisess date -&gt;                        apply vis strict filter (using </a:t>
+            </a:r>
+            <a:r>
+              <a:rPr lang="en-US" err="1"/>
+              <a:t>pval</a:t>
+            </a:r>
+            <a:r>
+              <a:rPr lang="en-US"/>
+              <a:t> &lt; </a:t>
+            </a:r>
+            <a:r>
+              <a:rPr lang="en-US" err="1"/>
+              <a:t>p_bonf</a:t>
+            </a:r>
+            <a:r>
+              <a:rPr lang="en-US"/>
+              <a:t>)</a:t>
+            </a:r>
+          </a:p>
+        </p:txBody>
+      </p:sp>
+      <p:pic>
+        <p:nvPicPr>
+          <p:cNvPr id="3" name="Picture 2">
+            <a:extLst>
+              <a:ext uri="{FF2B5EF4-FFF2-40B4-BE49-F238E27FC236}">
+                <a16:creationId xmlns:a16="http://schemas.microsoft.com/office/drawing/2014/main" id="{DAEE026A-3B42-4131-99D1-C44B1A2F75C2}"/>
+              </a:ext>
+            </a:extLst>
+          </p:cNvPr>
+          <p:cNvPicPr>
+            <a:picLocks noChangeAspect="1"/>
+          </p:cNvPicPr>
+          <p:nvPr/>
+        </p:nvPicPr>
+        <p:blipFill>
+          <a:blip r:embed="rId2"/>
+          <a:stretch>
+            <a:fillRect/>
+          </a:stretch>
+        </p:blipFill>
+        <p:spPr>
+          <a:xfrm>
+            <a:off x="1148443" y="1909665"/>
+            <a:ext cx="2057400" cy="1524000"/>
+          </a:xfrm>
+          <a:prstGeom prst="rect">
+            <a:avLst/>
+          </a:prstGeom>
+        </p:spPr>
+      </p:pic>
+      <p:pic>
+        <p:nvPicPr>
+          <p:cNvPr id="4" name="Picture 3">
+            <a:extLst>
+              <a:ext uri="{FF2B5EF4-FFF2-40B4-BE49-F238E27FC236}">
+                <a16:creationId xmlns:a16="http://schemas.microsoft.com/office/drawing/2014/main" id="{FAD62A77-58FC-4C96-B7B2-0D8BA54CCDB5}"/>
+              </a:ext>
+            </a:extLst>
+          </p:cNvPr>
+          <p:cNvPicPr>
+            <a:picLocks noChangeAspect="1"/>
+          </p:cNvPicPr>
+          <p:nvPr/>
+        </p:nvPicPr>
+        <p:blipFill>
+          <a:blip r:embed="rId3"/>
+          <a:stretch>
+            <a:fillRect/>
+          </a:stretch>
+        </p:blipFill>
+        <p:spPr>
+          <a:xfrm>
+            <a:off x="4282751" y="1876425"/>
+            <a:ext cx="2133600" cy="1552575"/>
+          </a:xfrm>
+          <a:prstGeom prst="rect">
+            <a:avLst/>
+          </a:prstGeom>
+        </p:spPr>
+      </p:pic>
+      <p:pic>
+        <p:nvPicPr>
+          <p:cNvPr id="5" name="Picture 4">
+            <a:extLst>
+              <a:ext uri="{FF2B5EF4-FFF2-40B4-BE49-F238E27FC236}">
+                <a16:creationId xmlns:a16="http://schemas.microsoft.com/office/drawing/2014/main" id="{5FB7D2B1-9230-48B0-83C7-ED67319B7FAB}"/>
+              </a:ext>
+            </a:extLst>
+          </p:cNvPr>
+          <p:cNvPicPr>
+            <a:picLocks noChangeAspect="1"/>
+          </p:cNvPicPr>
+          <p:nvPr/>
+        </p:nvPicPr>
+        <p:blipFill>
+          <a:blip r:embed="rId4"/>
+          <a:stretch>
+            <a:fillRect/>
+          </a:stretch>
+        </p:blipFill>
+        <p:spPr>
+          <a:xfrm>
+            <a:off x="7610182" y="1932992"/>
+            <a:ext cx="2028825" cy="1476375"/>
+          </a:xfrm>
+          <a:prstGeom prst="rect">
+            <a:avLst/>
+          </a:prstGeom>
+        </p:spPr>
+      </p:pic>
+      <p:pic>
+        <p:nvPicPr>
+          <p:cNvPr id="6" name="Picture 5">
+            <a:extLst>
+              <a:ext uri="{FF2B5EF4-FFF2-40B4-BE49-F238E27FC236}">
+                <a16:creationId xmlns:a16="http://schemas.microsoft.com/office/drawing/2014/main" id="{514B652C-5069-44B8-AB93-3296CE24EB8F}"/>
+              </a:ext>
+            </a:extLst>
+          </p:cNvPr>
+          <p:cNvPicPr>
+            <a:picLocks noChangeAspect="1"/>
+          </p:cNvPicPr>
+          <p:nvPr/>
+        </p:nvPicPr>
+        <p:blipFill>
+          <a:blip r:embed="rId5"/>
+          <a:stretch>
+            <a:fillRect/>
+          </a:stretch>
+        </p:blipFill>
+        <p:spPr>
+          <a:xfrm>
+            <a:off x="1307064" y="4102942"/>
+            <a:ext cx="2505075" cy="1619250"/>
+          </a:xfrm>
+          <a:prstGeom prst="rect">
+            <a:avLst/>
+          </a:prstGeom>
+        </p:spPr>
+      </p:pic>
+      <p:pic>
+        <p:nvPicPr>
+          <p:cNvPr id="7" name="Picture 6">
+            <a:extLst>
+              <a:ext uri="{FF2B5EF4-FFF2-40B4-BE49-F238E27FC236}">
+                <a16:creationId xmlns:a16="http://schemas.microsoft.com/office/drawing/2014/main" id="{739393B4-A816-484C-8CC1-236315FE741C}"/>
+              </a:ext>
+            </a:extLst>
+          </p:cNvPr>
+          <p:cNvPicPr>
+            <a:picLocks noChangeAspect="1"/>
+          </p:cNvPicPr>
+          <p:nvPr/>
+        </p:nvPicPr>
+        <p:blipFill>
+          <a:blip r:embed="rId6"/>
+          <a:stretch>
+            <a:fillRect/>
+          </a:stretch>
+        </p:blipFill>
+        <p:spPr>
+          <a:xfrm>
+            <a:off x="4534677" y="4131517"/>
+            <a:ext cx="2371725" cy="1562100"/>
+          </a:xfrm>
+          <a:prstGeom prst="rect">
+            <a:avLst/>
+          </a:prstGeom>
+        </p:spPr>
+      </p:pic>
+      <p:pic>
+        <p:nvPicPr>
+          <p:cNvPr id="8" name="Picture 7">
+            <a:extLst>
+              <a:ext uri="{FF2B5EF4-FFF2-40B4-BE49-F238E27FC236}">
+                <a16:creationId xmlns:a16="http://schemas.microsoft.com/office/drawing/2014/main" id="{26692DBF-1D26-4C9F-A910-E998CA58C7BB}"/>
+              </a:ext>
+            </a:extLst>
+          </p:cNvPr>
+          <p:cNvPicPr>
+            <a:picLocks noChangeAspect="1"/>
+          </p:cNvPicPr>
+          <p:nvPr/>
+        </p:nvPicPr>
+        <p:blipFill>
+          <a:blip r:embed="rId7"/>
+          <a:stretch>
+            <a:fillRect/>
+          </a:stretch>
+        </p:blipFill>
+        <p:spPr>
+          <a:xfrm>
+            <a:off x="7834215" y="4160092"/>
+            <a:ext cx="2333625" cy="1562100"/>
+          </a:xfrm>
+          <a:prstGeom prst="rect">
+            <a:avLst/>
+          </a:prstGeom>
+        </p:spPr>
+      </p:pic>
+    </p:spTree>
+    <p:extLst>
+      <p:ext uri="{BB962C8B-B14F-4D97-AF65-F5344CB8AC3E}">
+        <p14:creationId xmlns:p14="http://schemas.microsoft.com/office/powerpoint/2010/main" val="829773572"/>
+      </p:ext>
+    </p:extLst>
+  </p:cSld>
+  <p:clrMapOvr>
+    <a:masterClrMapping/>
+  </p:clrMapOvr>
+</p:sld>
+</file>
+
 <file path=ppt/theme/theme1.xml><?xml version="1.0" encoding="utf-8"?>
 <a:theme xmlns:a="http://schemas.openxmlformats.org/drawingml/2006/main" name="Office Theme">
   <a:themeElements>

</xml_diff>